<commit_message>
updating notebook and final presentation
</commit_message>
<xml_diff>
--- a/final_presentation.pptx
+++ b/final_presentation.pptx
@@ -19470,28 +19470,6 @@
               <a:buFont typeface="Arial"/>
               <a:buNone/>
             </a:pPr>
-            <a:endParaRPr sz="1700" dirty="0">
-              <a:latin typeface="Rockwell" panose="02060603020205020403" pitchFamily="18" charset="0"/>
-            </a:endParaRPr>
-          </a:p>
-          <a:p>
-            <a:pPr marL="0" lvl="0" indent="0" algn="l" rtl="0">
-              <a:lnSpc>
-                <a:spcPct val="110000"/>
-              </a:lnSpc>
-              <a:spcBef>
-                <a:spcPts val="850"/>
-              </a:spcBef>
-              <a:spcAft>
-                <a:spcPts val="0"/>
-              </a:spcAft>
-              <a:buClr>
-                <a:schemeClr val="dk1"/>
-              </a:buClr>
-              <a:buSzPts val="1100"/>
-              <a:buFont typeface="Arial"/>
-              <a:buNone/>
-            </a:pPr>
             <a:r>
               <a:rPr lang="en-US" sz="1700" u="sng" dirty="0" err="1">
                 <a:latin typeface="Rockwell" panose="02060603020205020403" pitchFamily="18" charset="0"/>
@@ -19599,6 +19577,60 @@
                 <a:latin typeface="Rockwell" panose="02060603020205020403" pitchFamily="18" charset="0"/>
               </a:rPr>
               <a:t>DBDiagram</a:t>
+            </a:r>
+            <a:endParaRPr lang="en-US" sz="1700" dirty="0">
+              <a:latin typeface="Rockwell" panose="02060603020205020403" pitchFamily="18" charset="0"/>
+            </a:endParaRPr>
+          </a:p>
+          <a:p>
+            <a:pPr marL="457200" lvl="0" indent="-336550" algn="l" rtl="0">
+              <a:lnSpc>
+                <a:spcPct val="110000"/>
+              </a:lnSpc>
+              <a:spcBef>
+                <a:spcPts val="0"/>
+              </a:spcBef>
+              <a:spcAft>
+                <a:spcPts val="0"/>
+              </a:spcAft>
+              <a:buSzPts val="1700"/>
+              <a:buChar char="●"/>
+            </a:pPr>
+            <a:r>
+              <a:rPr lang="en-US" sz="1700" dirty="0">
+                <a:latin typeface="Rockwell" panose="02060603020205020403" pitchFamily="18" charset="0"/>
+              </a:rPr>
+              <a:t>Google </a:t>
+            </a:r>
+            <a:r>
+              <a:rPr lang="en-US" sz="1700" dirty="0" err="1">
+                <a:latin typeface="Rockwell" panose="02060603020205020403" pitchFamily="18" charset="0"/>
+              </a:rPr>
+              <a:t>Colab</a:t>
+            </a:r>
+            <a:endParaRPr lang="en-US" sz="1700" dirty="0">
+              <a:latin typeface="Rockwell" panose="02060603020205020403" pitchFamily="18" charset="0"/>
+            </a:endParaRPr>
+          </a:p>
+          <a:p>
+            <a:pPr marL="457200" lvl="0" indent="-336550" algn="l" rtl="0">
+              <a:lnSpc>
+                <a:spcPct val="110000"/>
+              </a:lnSpc>
+              <a:spcBef>
+                <a:spcPts val="0"/>
+              </a:spcBef>
+              <a:spcAft>
+                <a:spcPts val="0"/>
+              </a:spcAft>
+              <a:buSzPts val="1700"/>
+              <a:buChar char="●"/>
+            </a:pPr>
+            <a:r>
+              <a:rPr lang="en-US" sz="1700" dirty="0">
+                <a:latin typeface="Rockwell" panose="02060603020205020403" pitchFamily="18" charset="0"/>
+              </a:rPr>
+              <a:t>Heroku</a:t>
             </a:r>
             <a:endParaRPr sz="1700" dirty="0">
               <a:latin typeface="Rockwell" panose="02060603020205020403" pitchFamily="18" charset="0"/>

</xml_diff>